<commit_message>
added in jesus name
</commit_message>
<xml_diff>
--- a/docs/songs_24-10-2021.pptx
+++ b/docs/songs_24-10-2021.pptx
@@ -33,6 +33,16 @@
     <p:sldId id="501" r:id="rId27"/>
     <p:sldId id="437" r:id="rId28"/>
     <p:sldId id="515" r:id="rId29"/>
+    <p:sldId id="516" r:id="rId30"/>
+    <p:sldId id="517" r:id="rId31"/>
+    <p:sldId id="518" r:id="rId32"/>
+    <p:sldId id="519" r:id="rId33"/>
+    <p:sldId id="524" r:id="rId34"/>
+    <p:sldId id="525" r:id="rId35"/>
+    <p:sldId id="523" r:id="rId36"/>
+    <p:sldId id="521" r:id="rId37"/>
+    <p:sldId id="526" r:id="rId38"/>
+    <p:sldId id="527" r:id="rId39"/>
   </p:sldIdLst>
   <p:sldSz cx="9144000" cy="6858000" type="screen4x3"/>
   <p:notesSz cx="6858000" cy="9144000"/>
@@ -6058,6 +6068,211 @@
 </p:sld>
 </file>
 
+<file path=ppt/slides/slide29.xml><?xml version="1.0" encoding="utf-8"?>
+<p:sld xmlns:a="http://schemas.openxmlformats.org/drawingml/2006/main" xmlns:r="http://schemas.openxmlformats.org/officeDocument/2006/relationships" xmlns:p="http://schemas.openxmlformats.org/presentationml/2006/main">
+  <p:cSld>
+    <p:spTree>
+      <p:nvGrpSpPr>
+        <p:cNvPr id="1" name=""/>
+        <p:cNvGrpSpPr/>
+        <p:nvPr/>
+      </p:nvGrpSpPr>
+      <p:grpSpPr>
+        <a:xfrm>
+          <a:off x="0" y="0"/>
+          <a:ext cx="0" cy="0"/>
+          <a:chOff x="0" y="0"/>
+          <a:chExt cx="0" cy="0"/>
+        </a:xfrm>
+      </p:grpSpPr>
+      <p:sp>
+        <p:nvSpPr>
+          <p:cNvPr id="3" name="Subtitle 2"/>
+          <p:cNvSpPr>
+            <a:spLocks noGrp="1"/>
+          </p:cNvSpPr>
+          <p:nvPr>
+            <p:ph type="subTitle" idx="1"/>
+          </p:nvPr>
+        </p:nvSpPr>
+        <p:spPr>
+          <a:xfrm>
+            <a:off x="323528" y="188640"/>
+            <a:ext cx="8640960" cy="6480720"/>
+          </a:xfrm>
+        </p:spPr>
+        <p:txBody>
+          <a:bodyPr>
+            <a:noAutofit/>
+          </a:bodyPr>
+          <a:lstStyle/>
+          <a:p>
+            <a:endParaRPr lang="en-GB" sz="6600" dirty="0">
+              <a:solidFill>
+                <a:srgbClr val="00A3E0"/>
+              </a:solidFill>
+              <a:latin typeface="akagi_probook"/>
+            </a:endParaRPr>
+          </a:p>
+          <a:p>
+            <a:r>
+              <a:rPr lang="en-GB" sz="6600" dirty="0">
+                <a:solidFill>
+                  <a:srgbClr val="00A3E0"/>
+                </a:solidFill>
+                <a:latin typeface="akagi_probook"/>
+              </a:rPr>
+              <a:t>In Jesus Name</a:t>
+            </a:r>
+          </a:p>
+          <a:p>
+            <a:r>
+              <a:rPr lang="en-GB" sz="1200" dirty="0">
+                <a:solidFill>
+                  <a:schemeClr val="bg1"/>
+                </a:solidFill>
+              </a:rPr>
+              <a:t>CCLI Song # 6454638</a:t>
+            </a:r>
+          </a:p>
+          <a:p>
+            <a:endParaRPr lang="en-GB" sz="1200" dirty="0">
+              <a:solidFill>
+                <a:schemeClr val="bg1"/>
+              </a:solidFill>
+            </a:endParaRPr>
+          </a:p>
+          <a:p>
+            <a:r>
+              <a:rPr lang="en-GB" sz="1200" dirty="0">
+                <a:solidFill>
+                  <a:schemeClr val="bg1"/>
+                </a:solidFill>
+              </a:rPr>
+              <a:t>Darlene </a:t>
+            </a:r>
+            <a:r>
+              <a:rPr lang="en-GB" sz="1200" dirty="0" err="1">
+                <a:solidFill>
+                  <a:schemeClr val="bg1"/>
+                </a:solidFill>
+              </a:rPr>
+              <a:t>Zschech</a:t>
+            </a:r>
+            <a:r>
+              <a:rPr lang="en-GB" sz="1200" dirty="0">
+                <a:solidFill>
+                  <a:schemeClr val="bg1"/>
+                </a:solidFill>
+              </a:rPr>
+              <a:t> | Israel Houghton</a:t>
+            </a:r>
+          </a:p>
+          <a:p>
+            <a:endParaRPr lang="en-GB" sz="1200" dirty="0">
+              <a:solidFill>
+                <a:schemeClr val="bg1"/>
+              </a:solidFill>
+            </a:endParaRPr>
+          </a:p>
+          <a:p>
+            <a:r>
+              <a:rPr lang="en-GB" sz="1200" dirty="0">
+                <a:solidFill>
+                  <a:schemeClr val="bg1"/>
+                </a:solidFill>
+              </a:rPr>
+              <a:t>© 2013 EWI (Admin. by Integrity Music Ltd)</a:t>
+            </a:r>
+          </a:p>
+          <a:p>
+            <a:r>
+              <a:rPr lang="en-GB" sz="1200" dirty="0">
+                <a:solidFill>
+                  <a:schemeClr val="bg1"/>
+                </a:solidFill>
+              </a:rPr>
+              <a:t>Integrity Worship Music (Admin. by Integrity Music Ltd)</a:t>
+            </a:r>
+          </a:p>
+          <a:p>
+            <a:r>
+              <a:rPr lang="en-GB" sz="1200" dirty="0">
+                <a:solidFill>
+                  <a:schemeClr val="bg1"/>
+                </a:solidFill>
+              </a:rPr>
+              <a:t>Integrity's Praise! Music (Admin. by Integrity Music Ltd)</a:t>
+            </a:r>
+          </a:p>
+          <a:p>
+            <a:r>
+              <a:rPr lang="en-GB" sz="1200" dirty="0">
+                <a:solidFill>
+                  <a:schemeClr val="bg1"/>
+                </a:solidFill>
+              </a:rPr>
+              <a:t>Sound Of The New Breed (Admin. by Integrity Music Ltd)</a:t>
+            </a:r>
+          </a:p>
+          <a:p>
+            <a:r>
+              <a:rPr lang="en-GB" sz="1200" dirty="0">
+                <a:solidFill>
+                  <a:schemeClr val="bg1"/>
+                </a:solidFill>
+              </a:rPr>
+              <a:t>For use solely with the </a:t>
+            </a:r>
+            <a:r>
+              <a:rPr lang="en-GB" sz="1200" dirty="0" err="1">
+                <a:solidFill>
+                  <a:schemeClr val="bg1"/>
+                </a:solidFill>
+              </a:rPr>
+              <a:t>SongSelect</a:t>
+            </a:r>
+            <a:r>
+              <a:rPr lang="en-GB" sz="1200" dirty="0">
+                <a:solidFill>
+                  <a:schemeClr val="bg1"/>
+                </a:solidFill>
+              </a:rPr>
+              <a:t>® Terms of Use. All rights reserved. www.ccli.com</a:t>
+            </a:r>
+          </a:p>
+          <a:p>
+            <a:endParaRPr lang="en-GB" sz="1200" dirty="0">
+              <a:solidFill>
+                <a:schemeClr val="bg1"/>
+              </a:solidFill>
+            </a:endParaRPr>
+          </a:p>
+          <a:p>
+            <a:r>
+              <a:rPr lang="en-GB" sz="1200" dirty="0">
+                <a:solidFill>
+                  <a:schemeClr val="bg1"/>
+                </a:solidFill>
+              </a:rPr>
+              <a:t>CCLI Licence No. 33265</a:t>
+            </a:r>
+          </a:p>
+        </p:txBody>
+      </p:sp>
+    </p:spTree>
+    <p:extLst>
+      <p:ext uri="{BB962C8B-B14F-4D97-AF65-F5344CB8AC3E}">
+        <p14:creationId xmlns:p14="http://schemas.microsoft.com/office/powerpoint/2010/main" val="2562573237"/>
+      </p:ext>
+    </p:extLst>
+  </p:cSld>
+  <p:clrMapOvr>
+    <a:masterClrMapping/>
+  </p:clrMapOvr>
+</p:sld>
+</file>
+
 <file path=ppt/slides/slide3.xml><?xml version="1.0" encoding="utf-8"?>
 <p:sld xmlns:a="http://schemas.openxmlformats.org/drawingml/2006/main" xmlns:r="http://schemas.openxmlformats.org/officeDocument/2006/relationships" xmlns:p="http://schemas.openxmlformats.org/presentationml/2006/main">
   <p:cSld>
@@ -6268,6 +6483,1256 @@
     <p:extLst>
       <p:ext uri="{BB962C8B-B14F-4D97-AF65-F5344CB8AC3E}">
         <p14:creationId xmlns:p14="http://schemas.microsoft.com/office/powerpoint/2010/main" val="348632634"/>
+      </p:ext>
+    </p:extLst>
+  </p:cSld>
+  <p:clrMapOvr>
+    <a:masterClrMapping/>
+  </p:clrMapOvr>
+</p:sld>
+</file>
+
+<file path=ppt/slides/slide30.xml><?xml version="1.0" encoding="utf-8"?>
+<p:sld xmlns:a="http://schemas.openxmlformats.org/drawingml/2006/main" xmlns:r="http://schemas.openxmlformats.org/officeDocument/2006/relationships" xmlns:p="http://schemas.openxmlformats.org/presentationml/2006/main">
+  <p:cSld>
+    <p:spTree>
+      <p:nvGrpSpPr>
+        <p:cNvPr id="1" name=""/>
+        <p:cNvGrpSpPr/>
+        <p:nvPr/>
+      </p:nvGrpSpPr>
+      <p:grpSpPr>
+        <a:xfrm>
+          <a:off x="0" y="0"/>
+          <a:ext cx="0" cy="0"/>
+          <a:chOff x="0" y="0"/>
+          <a:chExt cx="0" cy="0"/>
+        </a:xfrm>
+      </p:grpSpPr>
+      <p:sp>
+        <p:nvSpPr>
+          <p:cNvPr id="3" name="Subtitle 2"/>
+          <p:cNvSpPr>
+            <a:spLocks noGrp="1"/>
+          </p:cNvSpPr>
+          <p:nvPr>
+            <p:ph type="subTitle" idx="1"/>
+          </p:nvPr>
+        </p:nvSpPr>
+        <p:spPr>
+          <a:xfrm>
+            <a:off x="323528" y="188640"/>
+            <a:ext cx="8640960" cy="6480720"/>
+          </a:xfrm>
+        </p:spPr>
+        <p:txBody>
+          <a:bodyPr>
+            <a:noAutofit/>
+          </a:bodyPr>
+          <a:lstStyle/>
+          <a:p>
+            <a:r>
+              <a:rPr lang="en-GB" sz="5400" dirty="0">
+                <a:solidFill>
+                  <a:schemeClr val="bg1"/>
+                </a:solidFill>
+              </a:rPr>
+              <a:t>God is fighting for us God is on our side</a:t>
+            </a:r>
+          </a:p>
+          <a:p>
+            <a:r>
+              <a:rPr lang="en-GB" sz="5400" dirty="0">
+                <a:solidFill>
+                  <a:schemeClr val="bg1"/>
+                </a:solidFill>
+              </a:rPr>
+              <a:t>He has overcome yes</a:t>
+            </a:r>
+          </a:p>
+          <a:p>
+            <a:r>
+              <a:rPr lang="en-GB" sz="5400" dirty="0">
+                <a:solidFill>
+                  <a:schemeClr val="bg1"/>
+                </a:solidFill>
+              </a:rPr>
+              <a:t>He has overcome</a:t>
+            </a:r>
+          </a:p>
+          <a:p>
+            <a:r>
+              <a:rPr lang="en-GB" sz="5400" dirty="0">
+                <a:solidFill>
+                  <a:schemeClr val="bg1"/>
+                </a:solidFill>
+              </a:rPr>
+              <a:t>We will not be shaken we will not be moved</a:t>
+            </a:r>
+          </a:p>
+          <a:p>
+            <a:r>
+              <a:rPr lang="en-GB" sz="5400" dirty="0">
+                <a:solidFill>
+                  <a:schemeClr val="bg1"/>
+                </a:solidFill>
+              </a:rPr>
+              <a:t>Jesus You are here</a:t>
+            </a:r>
+          </a:p>
+        </p:txBody>
+      </p:sp>
+      <p:sp>
+        <p:nvSpPr>
+          <p:cNvPr id="4" name="TextBox 3"/>
+          <p:cNvSpPr txBox="1"/>
+          <p:nvPr/>
+        </p:nvSpPr>
+        <p:spPr>
+          <a:xfrm>
+            <a:off x="8529729" y="0"/>
+            <a:ext cx="628698" cy="461665"/>
+          </a:xfrm>
+          <a:prstGeom prst="rect">
+            <a:avLst/>
+          </a:prstGeom>
+          <a:noFill/>
+        </p:spPr>
+        <p:txBody>
+          <a:bodyPr wrap="none" rtlCol="0">
+            <a:spAutoFit/>
+          </a:bodyPr>
+          <a:lstStyle/>
+          <a:p>
+            <a:r>
+              <a:rPr lang="en-GB" sz="2400" b="1" dirty="0">
+                <a:solidFill>
+                  <a:schemeClr val="bg1"/>
+                </a:solidFill>
+              </a:rPr>
+              <a:t>1/9</a:t>
+            </a:r>
+          </a:p>
+        </p:txBody>
+      </p:sp>
+    </p:spTree>
+    <p:extLst>
+      <p:ext uri="{BB962C8B-B14F-4D97-AF65-F5344CB8AC3E}">
+        <p14:creationId xmlns:p14="http://schemas.microsoft.com/office/powerpoint/2010/main" val="1002804916"/>
+      </p:ext>
+    </p:extLst>
+  </p:cSld>
+  <p:clrMapOvr>
+    <a:masterClrMapping/>
+  </p:clrMapOvr>
+</p:sld>
+</file>
+
+<file path=ppt/slides/slide31.xml><?xml version="1.0" encoding="utf-8"?>
+<p:sld xmlns:a="http://schemas.openxmlformats.org/drawingml/2006/main" xmlns:r="http://schemas.openxmlformats.org/officeDocument/2006/relationships" xmlns:p="http://schemas.openxmlformats.org/presentationml/2006/main">
+  <p:cSld>
+    <p:spTree>
+      <p:nvGrpSpPr>
+        <p:cNvPr id="1" name=""/>
+        <p:cNvGrpSpPr/>
+        <p:nvPr/>
+      </p:nvGrpSpPr>
+      <p:grpSpPr>
+        <a:xfrm>
+          <a:off x="0" y="0"/>
+          <a:ext cx="0" cy="0"/>
+          <a:chOff x="0" y="0"/>
+          <a:chExt cx="0" cy="0"/>
+        </a:xfrm>
+      </p:grpSpPr>
+      <p:sp>
+        <p:nvSpPr>
+          <p:cNvPr id="3" name="Subtitle 2"/>
+          <p:cNvSpPr>
+            <a:spLocks noGrp="1"/>
+          </p:cNvSpPr>
+          <p:nvPr>
+            <p:ph type="subTitle" idx="1"/>
+          </p:nvPr>
+        </p:nvSpPr>
+        <p:spPr>
+          <a:xfrm>
+            <a:off x="323528" y="188640"/>
+            <a:ext cx="8640960" cy="6480720"/>
+          </a:xfrm>
+        </p:spPr>
+        <p:txBody>
+          <a:bodyPr>
+            <a:noAutofit/>
+          </a:bodyPr>
+          <a:lstStyle/>
+          <a:p>
+            <a:r>
+              <a:rPr lang="en-GB" sz="5400" dirty="0">
+                <a:solidFill>
+                  <a:schemeClr val="bg1"/>
+                </a:solidFill>
+              </a:rPr>
+              <a:t>Carrying our burdens covering our shame</a:t>
+            </a:r>
+          </a:p>
+          <a:p>
+            <a:r>
+              <a:rPr lang="en-GB" sz="5400" dirty="0">
+                <a:solidFill>
+                  <a:schemeClr val="bg1"/>
+                </a:solidFill>
+              </a:rPr>
+              <a:t>He has overcome yes</a:t>
+            </a:r>
+          </a:p>
+          <a:p>
+            <a:r>
+              <a:rPr lang="en-GB" sz="5400" dirty="0">
+                <a:solidFill>
+                  <a:schemeClr val="bg1"/>
+                </a:solidFill>
+              </a:rPr>
+              <a:t>He has overcome</a:t>
+            </a:r>
+          </a:p>
+          <a:p>
+            <a:r>
+              <a:rPr lang="en-GB" sz="5400" dirty="0">
+                <a:solidFill>
+                  <a:schemeClr val="bg1"/>
+                </a:solidFill>
+              </a:rPr>
+              <a:t>We will not be shaken we will not be moved</a:t>
+            </a:r>
+          </a:p>
+          <a:p>
+            <a:r>
+              <a:rPr lang="en-GB" sz="5400" dirty="0">
+                <a:solidFill>
+                  <a:schemeClr val="bg1"/>
+                </a:solidFill>
+              </a:rPr>
+              <a:t>Jesus You are here</a:t>
+            </a:r>
+          </a:p>
+        </p:txBody>
+      </p:sp>
+      <p:sp>
+        <p:nvSpPr>
+          <p:cNvPr id="4" name="TextBox 3"/>
+          <p:cNvSpPr txBox="1"/>
+          <p:nvPr/>
+        </p:nvSpPr>
+        <p:spPr>
+          <a:xfrm>
+            <a:off x="8529729" y="0"/>
+            <a:ext cx="628698" cy="461665"/>
+          </a:xfrm>
+          <a:prstGeom prst="rect">
+            <a:avLst/>
+          </a:prstGeom>
+          <a:noFill/>
+        </p:spPr>
+        <p:txBody>
+          <a:bodyPr wrap="none" rtlCol="0">
+            <a:spAutoFit/>
+          </a:bodyPr>
+          <a:lstStyle/>
+          <a:p>
+            <a:r>
+              <a:rPr lang="en-GB" sz="2400" b="1" dirty="0">
+                <a:solidFill>
+                  <a:schemeClr val="bg1"/>
+                </a:solidFill>
+              </a:rPr>
+              <a:t>2/9</a:t>
+            </a:r>
+          </a:p>
+        </p:txBody>
+      </p:sp>
+    </p:spTree>
+    <p:extLst>
+      <p:ext uri="{BB962C8B-B14F-4D97-AF65-F5344CB8AC3E}">
+        <p14:creationId xmlns:p14="http://schemas.microsoft.com/office/powerpoint/2010/main" val="1162680698"/>
+      </p:ext>
+    </p:extLst>
+  </p:cSld>
+  <p:clrMapOvr>
+    <a:masterClrMapping/>
+  </p:clrMapOvr>
+</p:sld>
+</file>
+
+<file path=ppt/slides/slide32.xml><?xml version="1.0" encoding="utf-8"?>
+<p:sld xmlns:a="http://schemas.openxmlformats.org/drawingml/2006/main" xmlns:r="http://schemas.openxmlformats.org/officeDocument/2006/relationships" xmlns:p="http://schemas.openxmlformats.org/presentationml/2006/main">
+  <p:cSld>
+    <p:spTree>
+      <p:nvGrpSpPr>
+        <p:cNvPr id="1" name=""/>
+        <p:cNvGrpSpPr/>
+        <p:nvPr/>
+      </p:nvGrpSpPr>
+      <p:grpSpPr>
+        <a:xfrm>
+          <a:off x="0" y="0"/>
+          <a:ext cx="0" cy="0"/>
+          <a:chOff x="0" y="0"/>
+          <a:chExt cx="0" cy="0"/>
+        </a:xfrm>
+      </p:grpSpPr>
+      <p:sp>
+        <p:nvSpPr>
+          <p:cNvPr id="3" name="Subtitle 2"/>
+          <p:cNvSpPr>
+            <a:spLocks noGrp="1"/>
+          </p:cNvSpPr>
+          <p:nvPr>
+            <p:ph type="subTitle" idx="1"/>
+          </p:nvPr>
+        </p:nvSpPr>
+        <p:spPr>
+          <a:xfrm>
+            <a:off x="323528" y="188640"/>
+            <a:ext cx="8640960" cy="6480720"/>
+          </a:xfrm>
+        </p:spPr>
+        <p:txBody>
+          <a:bodyPr>
+            <a:noAutofit/>
+          </a:bodyPr>
+          <a:lstStyle/>
+          <a:p>
+            <a:r>
+              <a:rPr lang="en-GB" sz="5400" dirty="0">
+                <a:solidFill>
+                  <a:schemeClr val="bg1"/>
+                </a:solidFill>
+              </a:rPr>
+              <a:t>I will live I will not die</a:t>
+            </a:r>
+          </a:p>
+          <a:p>
+            <a:r>
+              <a:rPr lang="en-GB" sz="5400" dirty="0">
+                <a:solidFill>
+                  <a:schemeClr val="bg1"/>
+                </a:solidFill>
+              </a:rPr>
+              <a:t>The resurrection </a:t>
+            </a:r>
+            <a:r>
+              <a:rPr lang="en-GB" sz="5400" dirty="0" err="1">
+                <a:solidFill>
+                  <a:schemeClr val="bg1"/>
+                </a:solidFill>
+              </a:rPr>
+              <a:t>pow'r</a:t>
+            </a:r>
+            <a:r>
+              <a:rPr lang="en-GB" sz="5400" dirty="0">
+                <a:solidFill>
+                  <a:schemeClr val="bg1"/>
+                </a:solidFill>
+              </a:rPr>
+              <a:t> of Christ alive in me</a:t>
+            </a:r>
+          </a:p>
+          <a:p>
+            <a:r>
+              <a:rPr lang="en-GB" sz="5400" dirty="0">
+                <a:solidFill>
+                  <a:schemeClr val="bg1"/>
+                </a:solidFill>
+              </a:rPr>
+              <a:t>And I am free in Jesus' Name</a:t>
+            </a:r>
+          </a:p>
+        </p:txBody>
+      </p:sp>
+      <p:sp>
+        <p:nvSpPr>
+          <p:cNvPr id="4" name="TextBox 3"/>
+          <p:cNvSpPr txBox="1"/>
+          <p:nvPr/>
+        </p:nvSpPr>
+        <p:spPr>
+          <a:xfrm>
+            <a:off x="8529729" y="0"/>
+            <a:ext cx="628698" cy="461665"/>
+          </a:xfrm>
+          <a:prstGeom prst="rect">
+            <a:avLst/>
+          </a:prstGeom>
+          <a:noFill/>
+        </p:spPr>
+        <p:txBody>
+          <a:bodyPr wrap="none" rtlCol="0">
+            <a:spAutoFit/>
+          </a:bodyPr>
+          <a:lstStyle/>
+          <a:p>
+            <a:r>
+              <a:rPr lang="en-GB" sz="2400" b="1" dirty="0">
+                <a:solidFill>
+                  <a:schemeClr val="bg1"/>
+                </a:solidFill>
+              </a:rPr>
+              <a:t>3/9</a:t>
+            </a:r>
+          </a:p>
+        </p:txBody>
+      </p:sp>
+    </p:spTree>
+    <p:extLst>
+      <p:ext uri="{BB962C8B-B14F-4D97-AF65-F5344CB8AC3E}">
+        <p14:creationId xmlns:p14="http://schemas.microsoft.com/office/powerpoint/2010/main" val="3044235001"/>
+      </p:ext>
+    </p:extLst>
+  </p:cSld>
+  <p:clrMapOvr>
+    <a:masterClrMapping/>
+  </p:clrMapOvr>
+</p:sld>
+</file>
+
+<file path=ppt/slides/slide33.xml><?xml version="1.0" encoding="utf-8"?>
+<p:sld xmlns:a="http://schemas.openxmlformats.org/drawingml/2006/main" xmlns:r="http://schemas.openxmlformats.org/officeDocument/2006/relationships" xmlns:p="http://schemas.openxmlformats.org/presentationml/2006/main">
+  <p:cSld>
+    <p:spTree>
+      <p:nvGrpSpPr>
+        <p:cNvPr id="1" name=""/>
+        <p:cNvGrpSpPr/>
+        <p:nvPr/>
+      </p:nvGrpSpPr>
+      <p:grpSpPr>
+        <a:xfrm>
+          <a:off x="0" y="0"/>
+          <a:ext cx="0" cy="0"/>
+          <a:chOff x="0" y="0"/>
+          <a:chExt cx="0" cy="0"/>
+        </a:xfrm>
+      </p:grpSpPr>
+      <p:sp>
+        <p:nvSpPr>
+          <p:cNvPr id="3" name="Subtitle 2"/>
+          <p:cNvSpPr>
+            <a:spLocks noGrp="1"/>
+          </p:cNvSpPr>
+          <p:nvPr>
+            <p:ph type="subTitle" idx="1"/>
+          </p:nvPr>
+        </p:nvSpPr>
+        <p:spPr>
+          <a:xfrm>
+            <a:off x="323528" y="188640"/>
+            <a:ext cx="8640960" cy="6480720"/>
+          </a:xfrm>
+        </p:spPr>
+        <p:txBody>
+          <a:bodyPr>
+            <a:noAutofit/>
+          </a:bodyPr>
+          <a:lstStyle/>
+          <a:p>
+            <a:r>
+              <a:rPr lang="en-GB" sz="5400" dirty="0">
+                <a:solidFill>
+                  <a:schemeClr val="bg1"/>
+                </a:solidFill>
+              </a:rPr>
+              <a:t>Carrying our burdens covering our shame</a:t>
+            </a:r>
+          </a:p>
+          <a:p>
+            <a:r>
+              <a:rPr lang="en-GB" sz="5400" dirty="0">
+                <a:solidFill>
+                  <a:schemeClr val="bg1"/>
+                </a:solidFill>
+              </a:rPr>
+              <a:t>He has overcome yes</a:t>
+            </a:r>
+          </a:p>
+          <a:p>
+            <a:r>
+              <a:rPr lang="en-GB" sz="5400" dirty="0">
+                <a:solidFill>
+                  <a:schemeClr val="bg1"/>
+                </a:solidFill>
+              </a:rPr>
+              <a:t>He has overcome</a:t>
+            </a:r>
+          </a:p>
+          <a:p>
+            <a:r>
+              <a:rPr lang="en-GB" sz="5400" dirty="0">
+                <a:solidFill>
+                  <a:schemeClr val="bg1"/>
+                </a:solidFill>
+              </a:rPr>
+              <a:t>We will not be shaken we will not be moved</a:t>
+            </a:r>
+          </a:p>
+          <a:p>
+            <a:r>
+              <a:rPr lang="en-GB" sz="5400" dirty="0">
+                <a:solidFill>
+                  <a:schemeClr val="bg1"/>
+                </a:solidFill>
+              </a:rPr>
+              <a:t>Jesus You are here</a:t>
+            </a:r>
+          </a:p>
+        </p:txBody>
+      </p:sp>
+      <p:sp>
+        <p:nvSpPr>
+          <p:cNvPr id="4" name="TextBox 3"/>
+          <p:cNvSpPr txBox="1"/>
+          <p:nvPr/>
+        </p:nvSpPr>
+        <p:spPr>
+          <a:xfrm>
+            <a:off x="8529729" y="0"/>
+            <a:ext cx="628698" cy="461665"/>
+          </a:xfrm>
+          <a:prstGeom prst="rect">
+            <a:avLst/>
+          </a:prstGeom>
+          <a:noFill/>
+        </p:spPr>
+        <p:txBody>
+          <a:bodyPr wrap="none" rtlCol="0">
+            <a:spAutoFit/>
+          </a:bodyPr>
+          <a:lstStyle/>
+          <a:p>
+            <a:r>
+              <a:rPr lang="en-GB" sz="2400" b="1" dirty="0">
+                <a:solidFill>
+                  <a:schemeClr val="bg1"/>
+                </a:solidFill>
+              </a:rPr>
+              <a:t>4/9</a:t>
+            </a:r>
+          </a:p>
+        </p:txBody>
+      </p:sp>
+    </p:spTree>
+    <p:extLst>
+      <p:ext uri="{BB962C8B-B14F-4D97-AF65-F5344CB8AC3E}">
+        <p14:creationId xmlns:p14="http://schemas.microsoft.com/office/powerpoint/2010/main" val="2604762095"/>
+      </p:ext>
+    </p:extLst>
+  </p:cSld>
+  <p:clrMapOvr>
+    <a:masterClrMapping/>
+  </p:clrMapOvr>
+</p:sld>
+</file>
+
+<file path=ppt/slides/slide34.xml><?xml version="1.0" encoding="utf-8"?>
+<p:sld xmlns:a="http://schemas.openxmlformats.org/drawingml/2006/main" xmlns:r="http://schemas.openxmlformats.org/officeDocument/2006/relationships" xmlns:p="http://schemas.openxmlformats.org/presentationml/2006/main">
+  <p:cSld>
+    <p:spTree>
+      <p:nvGrpSpPr>
+        <p:cNvPr id="1" name=""/>
+        <p:cNvGrpSpPr/>
+        <p:nvPr/>
+      </p:nvGrpSpPr>
+      <p:grpSpPr>
+        <a:xfrm>
+          <a:off x="0" y="0"/>
+          <a:ext cx="0" cy="0"/>
+          <a:chOff x="0" y="0"/>
+          <a:chExt cx="0" cy="0"/>
+        </a:xfrm>
+      </p:grpSpPr>
+      <p:sp>
+        <p:nvSpPr>
+          <p:cNvPr id="3" name="Subtitle 2"/>
+          <p:cNvSpPr>
+            <a:spLocks noGrp="1"/>
+          </p:cNvSpPr>
+          <p:nvPr>
+            <p:ph type="subTitle" idx="1"/>
+          </p:nvPr>
+        </p:nvSpPr>
+        <p:spPr>
+          <a:xfrm>
+            <a:off x="323528" y="188640"/>
+            <a:ext cx="8640960" cy="6480720"/>
+          </a:xfrm>
+        </p:spPr>
+        <p:txBody>
+          <a:bodyPr>
+            <a:noAutofit/>
+          </a:bodyPr>
+          <a:lstStyle/>
+          <a:p>
+            <a:r>
+              <a:rPr lang="en-GB" sz="5400" dirty="0">
+                <a:solidFill>
+                  <a:schemeClr val="bg1"/>
+                </a:solidFill>
+              </a:rPr>
+              <a:t>I will live I will not die</a:t>
+            </a:r>
+          </a:p>
+          <a:p>
+            <a:r>
+              <a:rPr lang="en-GB" sz="5400" dirty="0">
+                <a:solidFill>
+                  <a:schemeClr val="bg1"/>
+                </a:solidFill>
+              </a:rPr>
+              <a:t>The resurrection </a:t>
+            </a:r>
+            <a:r>
+              <a:rPr lang="en-GB" sz="5400" dirty="0" err="1">
+                <a:solidFill>
+                  <a:schemeClr val="bg1"/>
+                </a:solidFill>
+              </a:rPr>
+              <a:t>pow'r</a:t>
+            </a:r>
+            <a:r>
+              <a:rPr lang="en-GB" sz="5400" dirty="0">
+                <a:solidFill>
+                  <a:schemeClr val="bg1"/>
+                </a:solidFill>
+              </a:rPr>
+              <a:t> of Christ alive in me</a:t>
+            </a:r>
+          </a:p>
+          <a:p>
+            <a:r>
+              <a:rPr lang="en-GB" sz="5400" dirty="0">
+                <a:solidFill>
+                  <a:schemeClr val="bg1"/>
+                </a:solidFill>
+              </a:rPr>
+              <a:t>And I am free in Jesus' Name</a:t>
+            </a:r>
+          </a:p>
+        </p:txBody>
+      </p:sp>
+      <p:sp>
+        <p:nvSpPr>
+          <p:cNvPr id="4" name="TextBox 3"/>
+          <p:cNvSpPr txBox="1"/>
+          <p:nvPr/>
+        </p:nvSpPr>
+        <p:spPr>
+          <a:xfrm>
+            <a:off x="8529729" y="0"/>
+            <a:ext cx="628698" cy="461665"/>
+          </a:xfrm>
+          <a:prstGeom prst="rect">
+            <a:avLst/>
+          </a:prstGeom>
+          <a:noFill/>
+        </p:spPr>
+        <p:txBody>
+          <a:bodyPr wrap="none" rtlCol="0">
+            <a:spAutoFit/>
+          </a:bodyPr>
+          <a:lstStyle/>
+          <a:p>
+            <a:r>
+              <a:rPr lang="en-GB" sz="2400" b="1" dirty="0">
+                <a:solidFill>
+                  <a:schemeClr val="bg1"/>
+                </a:solidFill>
+              </a:rPr>
+              <a:t>5/9</a:t>
+            </a:r>
+          </a:p>
+        </p:txBody>
+      </p:sp>
+    </p:spTree>
+    <p:extLst>
+      <p:ext uri="{BB962C8B-B14F-4D97-AF65-F5344CB8AC3E}">
+        <p14:creationId xmlns:p14="http://schemas.microsoft.com/office/powerpoint/2010/main" val="4251098172"/>
+      </p:ext>
+    </p:extLst>
+  </p:cSld>
+  <p:clrMapOvr>
+    <a:masterClrMapping/>
+  </p:clrMapOvr>
+</p:sld>
+</file>
+
+<file path=ppt/slides/slide35.xml><?xml version="1.0" encoding="utf-8"?>
+<p:sld xmlns:a="http://schemas.openxmlformats.org/drawingml/2006/main" xmlns:r="http://schemas.openxmlformats.org/officeDocument/2006/relationships" xmlns:p="http://schemas.openxmlformats.org/presentationml/2006/main">
+  <p:cSld>
+    <p:spTree>
+      <p:nvGrpSpPr>
+        <p:cNvPr id="1" name=""/>
+        <p:cNvGrpSpPr/>
+        <p:nvPr/>
+      </p:nvGrpSpPr>
+      <p:grpSpPr>
+        <a:xfrm>
+          <a:off x="0" y="0"/>
+          <a:ext cx="0" cy="0"/>
+          <a:chOff x="0" y="0"/>
+          <a:chExt cx="0" cy="0"/>
+        </a:xfrm>
+      </p:grpSpPr>
+      <p:sp>
+        <p:nvSpPr>
+          <p:cNvPr id="3" name="Subtitle 2"/>
+          <p:cNvSpPr>
+            <a:spLocks noGrp="1"/>
+          </p:cNvSpPr>
+          <p:nvPr>
+            <p:ph type="subTitle" idx="1"/>
+          </p:nvPr>
+        </p:nvSpPr>
+        <p:spPr>
+          <a:xfrm>
+            <a:off x="323528" y="188640"/>
+            <a:ext cx="8640960" cy="6480720"/>
+          </a:xfrm>
+        </p:spPr>
+        <p:txBody>
+          <a:bodyPr>
+            <a:noAutofit/>
+          </a:bodyPr>
+          <a:lstStyle/>
+          <a:p>
+            <a:r>
+              <a:rPr lang="en-GB" sz="5400" dirty="0">
+                <a:solidFill>
+                  <a:schemeClr val="bg1"/>
+                </a:solidFill>
+              </a:rPr>
+              <a:t>I will live I will not die</a:t>
+            </a:r>
+          </a:p>
+          <a:p>
+            <a:r>
+              <a:rPr lang="en-GB" sz="5400" dirty="0">
+                <a:solidFill>
+                  <a:schemeClr val="bg1"/>
+                </a:solidFill>
+              </a:rPr>
+              <a:t>I will declare and lift You high</a:t>
+            </a:r>
+          </a:p>
+          <a:p>
+            <a:r>
+              <a:rPr lang="en-GB" sz="5400" dirty="0">
+                <a:solidFill>
+                  <a:schemeClr val="bg1"/>
+                </a:solidFill>
+              </a:rPr>
+              <a:t>Christ revealed and I am healed in Jesus' Name</a:t>
+            </a:r>
+          </a:p>
+        </p:txBody>
+      </p:sp>
+      <p:sp>
+        <p:nvSpPr>
+          <p:cNvPr id="4" name="TextBox 3"/>
+          <p:cNvSpPr txBox="1"/>
+          <p:nvPr/>
+        </p:nvSpPr>
+        <p:spPr>
+          <a:xfrm>
+            <a:off x="8529729" y="0"/>
+            <a:ext cx="628698" cy="461665"/>
+          </a:xfrm>
+          <a:prstGeom prst="rect">
+            <a:avLst/>
+          </a:prstGeom>
+          <a:noFill/>
+        </p:spPr>
+        <p:txBody>
+          <a:bodyPr wrap="none" rtlCol="0">
+            <a:spAutoFit/>
+          </a:bodyPr>
+          <a:lstStyle/>
+          <a:p>
+            <a:r>
+              <a:rPr lang="en-GB" sz="2400" b="1" dirty="0">
+                <a:solidFill>
+                  <a:schemeClr val="bg1"/>
+                </a:solidFill>
+              </a:rPr>
+              <a:t>6/9</a:t>
+            </a:r>
+          </a:p>
+        </p:txBody>
+      </p:sp>
+    </p:spTree>
+    <p:extLst>
+      <p:ext uri="{BB962C8B-B14F-4D97-AF65-F5344CB8AC3E}">
+        <p14:creationId xmlns:p14="http://schemas.microsoft.com/office/powerpoint/2010/main" val="50309891"/>
+      </p:ext>
+    </p:extLst>
+  </p:cSld>
+  <p:clrMapOvr>
+    <a:masterClrMapping/>
+  </p:clrMapOvr>
+</p:sld>
+</file>
+
+<file path=ppt/slides/slide36.xml><?xml version="1.0" encoding="utf-8"?>
+<p:sld xmlns:a="http://schemas.openxmlformats.org/drawingml/2006/main" xmlns:r="http://schemas.openxmlformats.org/officeDocument/2006/relationships" xmlns:p="http://schemas.openxmlformats.org/presentationml/2006/main">
+  <p:cSld>
+    <p:spTree>
+      <p:nvGrpSpPr>
+        <p:cNvPr id="1" name=""/>
+        <p:cNvGrpSpPr/>
+        <p:nvPr/>
+      </p:nvGrpSpPr>
+      <p:grpSpPr>
+        <a:xfrm>
+          <a:off x="0" y="0"/>
+          <a:ext cx="0" cy="0"/>
+          <a:chOff x="0" y="0"/>
+          <a:chExt cx="0" cy="0"/>
+        </a:xfrm>
+      </p:grpSpPr>
+      <p:sp>
+        <p:nvSpPr>
+          <p:cNvPr id="3" name="Subtitle 2"/>
+          <p:cNvSpPr>
+            <a:spLocks noGrp="1"/>
+          </p:cNvSpPr>
+          <p:nvPr>
+            <p:ph type="subTitle" idx="1"/>
+          </p:nvPr>
+        </p:nvSpPr>
+        <p:spPr>
+          <a:xfrm>
+            <a:off x="323528" y="188640"/>
+            <a:ext cx="8640960" cy="6480720"/>
+          </a:xfrm>
+        </p:spPr>
+        <p:txBody>
+          <a:bodyPr>
+            <a:noAutofit/>
+          </a:bodyPr>
+          <a:lstStyle/>
+          <a:p>
+            <a:r>
+              <a:rPr lang="en-GB" sz="5000" dirty="0">
+                <a:solidFill>
+                  <a:schemeClr val="bg1"/>
+                </a:solidFill>
+              </a:rPr>
+              <a:t>God is fighting for us pushing back the darkness</a:t>
+            </a:r>
+          </a:p>
+          <a:p>
+            <a:r>
+              <a:rPr lang="en-GB" sz="5000" dirty="0">
+                <a:solidFill>
+                  <a:schemeClr val="bg1"/>
+                </a:solidFill>
+              </a:rPr>
+              <a:t>Lighting up the Kingdom that cannot be shaken</a:t>
+            </a:r>
+          </a:p>
+          <a:p>
+            <a:r>
+              <a:rPr lang="en-GB" sz="5000" dirty="0">
+                <a:solidFill>
+                  <a:schemeClr val="bg1"/>
+                </a:solidFill>
+              </a:rPr>
+              <a:t>In the Name of Jesus enemy's defeated</a:t>
+            </a:r>
+          </a:p>
+          <a:p>
+            <a:r>
+              <a:rPr lang="en-GB" sz="5000" dirty="0">
+                <a:solidFill>
+                  <a:schemeClr val="bg1"/>
+                </a:solidFill>
+              </a:rPr>
+              <a:t>And we will shout it out shout it out</a:t>
+            </a:r>
+          </a:p>
+        </p:txBody>
+      </p:sp>
+      <p:sp>
+        <p:nvSpPr>
+          <p:cNvPr id="4" name="TextBox 3"/>
+          <p:cNvSpPr txBox="1"/>
+          <p:nvPr/>
+        </p:nvSpPr>
+        <p:spPr>
+          <a:xfrm>
+            <a:off x="8529729" y="0"/>
+            <a:ext cx="628698" cy="461665"/>
+          </a:xfrm>
+          <a:prstGeom prst="rect">
+            <a:avLst/>
+          </a:prstGeom>
+          <a:noFill/>
+        </p:spPr>
+        <p:txBody>
+          <a:bodyPr wrap="none" rtlCol="0">
+            <a:spAutoFit/>
+          </a:bodyPr>
+          <a:lstStyle/>
+          <a:p>
+            <a:r>
+              <a:rPr lang="en-GB" sz="2400" b="1" dirty="0">
+                <a:solidFill>
+                  <a:schemeClr val="bg1"/>
+                </a:solidFill>
+              </a:rPr>
+              <a:t>7/9</a:t>
+            </a:r>
+          </a:p>
+        </p:txBody>
+      </p:sp>
+    </p:spTree>
+    <p:extLst>
+      <p:ext uri="{BB962C8B-B14F-4D97-AF65-F5344CB8AC3E}">
+        <p14:creationId xmlns:p14="http://schemas.microsoft.com/office/powerpoint/2010/main" val="860279095"/>
+      </p:ext>
+    </p:extLst>
+  </p:cSld>
+  <p:clrMapOvr>
+    <a:masterClrMapping/>
+  </p:clrMapOvr>
+</p:sld>
+</file>
+
+<file path=ppt/slides/slide37.xml><?xml version="1.0" encoding="utf-8"?>
+<p:sld xmlns:a="http://schemas.openxmlformats.org/drawingml/2006/main" xmlns:r="http://schemas.openxmlformats.org/officeDocument/2006/relationships" xmlns:p="http://schemas.openxmlformats.org/presentationml/2006/main">
+  <p:cSld>
+    <p:spTree>
+      <p:nvGrpSpPr>
+        <p:cNvPr id="1" name=""/>
+        <p:cNvGrpSpPr/>
+        <p:nvPr/>
+      </p:nvGrpSpPr>
+      <p:grpSpPr>
+        <a:xfrm>
+          <a:off x="0" y="0"/>
+          <a:ext cx="0" cy="0"/>
+          <a:chOff x="0" y="0"/>
+          <a:chExt cx="0" cy="0"/>
+        </a:xfrm>
+      </p:grpSpPr>
+      <p:sp>
+        <p:nvSpPr>
+          <p:cNvPr id="3" name="Subtitle 2"/>
+          <p:cNvSpPr>
+            <a:spLocks noGrp="1"/>
+          </p:cNvSpPr>
+          <p:nvPr>
+            <p:ph type="subTitle" idx="1"/>
+          </p:nvPr>
+        </p:nvSpPr>
+        <p:spPr>
+          <a:xfrm>
+            <a:off x="323528" y="188640"/>
+            <a:ext cx="8640960" cy="6480720"/>
+          </a:xfrm>
+        </p:spPr>
+        <p:txBody>
+          <a:bodyPr>
+            <a:noAutofit/>
+          </a:bodyPr>
+          <a:lstStyle/>
+          <a:p>
+            <a:r>
+              <a:rPr lang="en-GB" sz="5400" dirty="0">
+                <a:solidFill>
+                  <a:schemeClr val="bg1"/>
+                </a:solidFill>
+              </a:rPr>
+              <a:t>I will live I will not die</a:t>
+            </a:r>
+          </a:p>
+          <a:p>
+            <a:r>
+              <a:rPr lang="en-GB" sz="5400" dirty="0">
+                <a:solidFill>
+                  <a:schemeClr val="bg1"/>
+                </a:solidFill>
+              </a:rPr>
+              <a:t>The resurrection </a:t>
+            </a:r>
+            <a:r>
+              <a:rPr lang="en-GB" sz="5400" dirty="0" err="1">
+                <a:solidFill>
+                  <a:schemeClr val="bg1"/>
+                </a:solidFill>
+              </a:rPr>
+              <a:t>pow'r</a:t>
+            </a:r>
+            <a:r>
+              <a:rPr lang="en-GB" sz="5400" dirty="0">
+                <a:solidFill>
+                  <a:schemeClr val="bg1"/>
+                </a:solidFill>
+              </a:rPr>
+              <a:t> of Christ alive in me</a:t>
+            </a:r>
+          </a:p>
+          <a:p>
+            <a:r>
+              <a:rPr lang="en-GB" sz="5400" dirty="0">
+                <a:solidFill>
+                  <a:schemeClr val="bg1"/>
+                </a:solidFill>
+              </a:rPr>
+              <a:t>And I am free in Jesus' Name</a:t>
+            </a:r>
+          </a:p>
+        </p:txBody>
+      </p:sp>
+      <p:sp>
+        <p:nvSpPr>
+          <p:cNvPr id="4" name="TextBox 3"/>
+          <p:cNvSpPr txBox="1"/>
+          <p:nvPr/>
+        </p:nvSpPr>
+        <p:spPr>
+          <a:xfrm>
+            <a:off x="8529729" y="0"/>
+            <a:ext cx="628698" cy="461665"/>
+          </a:xfrm>
+          <a:prstGeom prst="rect">
+            <a:avLst/>
+          </a:prstGeom>
+          <a:noFill/>
+        </p:spPr>
+        <p:txBody>
+          <a:bodyPr wrap="none" rtlCol="0">
+            <a:spAutoFit/>
+          </a:bodyPr>
+          <a:lstStyle/>
+          <a:p>
+            <a:r>
+              <a:rPr lang="en-GB" sz="2400" b="1" dirty="0">
+                <a:solidFill>
+                  <a:schemeClr val="bg1"/>
+                </a:solidFill>
+              </a:rPr>
+              <a:t>8/9</a:t>
+            </a:r>
+          </a:p>
+        </p:txBody>
+      </p:sp>
+    </p:spTree>
+    <p:extLst>
+      <p:ext uri="{BB962C8B-B14F-4D97-AF65-F5344CB8AC3E}">
+        <p14:creationId xmlns:p14="http://schemas.microsoft.com/office/powerpoint/2010/main" val="3004051043"/>
+      </p:ext>
+    </p:extLst>
+  </p:cSld>
+  <p:clrMapOvr>
+    <a:masterClrMapping/>
+  </p:clrMapOvr>
+</p:sld>
+</file>
+
+<file path=ppt/slides/slide38.xml><?xml version="1.0" encoding="utf-8"?>
+<p:sld xmlns:a="http://schemas.openxmlformats.org/drawingml/2006/main" xmlns:r="http://schemas.openxmlformats.org/officeDocument/2006/relationships" xmlns:p="http://schemas.openxmlformats.org/presentationml/2006/main">
+  <p:cSld>
+    <p:spTree>
+      <p:nvGrpSpPr>
+        <p:cNvPr id="1" name=""/>
+        <p:cNvGrpSpPr/>
+        <p:nvPr/>
+      </p:nvGrpSpPr>
+      <p:grpSpPr>
+        <a:xfrm>
+          <a:off x="0" y="0"/>
+          <a:ext cx="0" cy="0"/>
+          <a:chOff x="0" y="0"/>
+          <a:chExt cx="0" cy="0"/>
+        </a:xfrm>
+      </p:grpSpPr>
+      <p:sp>
+        <p:nvSpPr>
+          <p:cNvPr id="3" name="Subtitle 2"/>
+          <p:cNvSpPr>
+            <a:spLocks noGrp="1"/>
+          </p:cNvSpPr>
+          <p:nvPr>
+            <p:ph type="subTitle" idx="1"/>
+          </p:nvPr>
+        </p:nvSpPr>
+        <p:spPr>
+          <a:xfrm>
+            <a:off x="323528" y="188640"/>
+            <a:ext cx="8640960" cy="6480720"/>
+          </a:xfrm>
+        </p:spPr>
+        <p:txBody>
+          <a:bodyPr>
+            <a:noAutofit/>
+          </a:bodyPr>
+          <a:lstStyle/>
+          <a:p>
+            <a:r>
+              <a:rPr lang="en-GB" sz="5400" dirty="0">
+                <a:solidFill>
+                  <a:schemeClr val="bg1"/>
+                </a:solidFill>
+              </a:rPr>
+              <a:t>I will live I will not die</a:t>
+            </a:r>
+          </a:p>
+          <a:p>
+            <a:r>
+              <a:rPr lang="en-GB" sz="5400" dirty="0">
+                <a:solidFill>
+                  <a:schemeClr val="bg1"/>
+                </a:solidFill>
+              </a:rPr>
+              <a:t>I will declare and lift You high</a:t>
+            </a:r>
+          </a:p>
+          <a:p>
+            <a:r>
+              <a:rPr lang="en-GB" sz="5400" dirty="0">
+                <a:solidFill>
+                  <a:schemeClr val="bg1"/>
+                </a:solidFill>
+              </a:rPr>
+              <a:t>Christ revealed and I am healed in Jesus' Name</a:t>
+            </a:r>
+            <a:br>
+              <a:rPr lang="en-GB" sz="5400" dirty="0">
+                <a:solidFill>
+                  <a:schemeClr val="bg1"/>
+                </a:solidFill>
+              </a:rPr>
+            </a:br>
+            <a:r>
+              <a:rPr lang="nl-NL" sz="5400" dirty="0">
+                <a:solidFill>
+                  <a:schemeClr val="bg1"/>
+                </a:solidFill>
+              </a:rPr>
+              <a:t>In </a:t>
+            </a:r>
+            <a:r>
+              <a:rPr lang="nl-NL" sz="5400" dirty="0" err="1">
+                <a:solidFill>
+                  <a:schemeClr val="bg1"/>
+                </a:solidFill>
+              </a:rPr>
+              <a:t>Jesus</a:t>
+            </a:r>
+            <a:r>
+              <a:rPr lang="nl-NL" sz="5400" dirty="0">
+                <a:solidFill>
+                  <a:schemeClr val="bg1"/>
+                </a:solidFill>
+              </a:rPr>
+              <a:t>' Name</a:t>
+            </a:r>
+          </a:p>
+          <a:p>
+            <a:r>
+              <a:rPr lang="nl-NL" sz="5400" dirty="0">
+                <a:solidFill>
+                  <a:schemeClr val="bg1"/>
+                </a:solidFill>
+              </a:rPr>
+              <a:t>In </a:t>
+            </a:r>
+            <a:r>
+              <a:rPr lang="nl-NL" sz="5400" dirty="0" err="1">
+                <a:solidFill>
+                  <a:schemeClr val="bg1"/>
+                </a:solidFill>
+              </a:rPr>
+              <a:t>Jesus</a:t>
+            </a:r>
+            <a:r>
+              <a:rPr lang="nl-NL" sz="5400" dirty="0">
+                <a:solidFill>
+                  <a:schemeClr val="bg1"/>
+                </a:solidFill>
+              </a:rPr>
+              <a:t>' Name</a:t>
+            </a:r>
+          </a:p>
+          <a:p>
+            <a:r>
+              <a:rPr lang="nl-NL" sz="5400" dirty="0">
+                <a:solidFill>
+                  <a:schemeClr val="bg1"/>
+                </a:solidFill>
+              </a:rPr>
+              <a:t>In </a:t>
+            </a:r>
+            <a:r>
+              <a:rPr lang="nl-NL" sz="5400" dirty="0" err="1">
+                <a:solidFill>
+                  <a:schemeClr val="bg1"/>
+                </a:solidFill>
+              </a:rPr>
+              <a:t>Jesus</a:t>
+            </a:r>
+            <a:r>
+              <a:rPr lang="nl-NL" sz="5400" dirty="0">
+                <a:solidFill>
+                  <a:schemeClr val="bg1"/>
+                </a:solidFill>
+              </a:rPr>
+              <a:t>' Name</a:t>
+            </a:r>
+            <a:endParaRPr lang="en-GB" sz="5400" dirty="0">
+              <a:solidFill>
+                <a:schemeClr val="bg1"/>
+              </a:solidFill>
+            </a:endParaRPr>
+          </a:p>
+        </p:txBody>
+      </p:sp>
+      <p:sp>
+        <p:nvSpPr>
+          <p:cNvPr id="4" name="TextBox 3"/>
+          <p:cNvSpPr txBox="1"/>
+          <p:nvPr/>
+        </p:nvSpPr>
+        <p:spPr>
+          <a:xfrm>
+            <a:off x="8529729" y="0"/>
+            <a:ext cx="628698" cy="461665"/>
+          </a:xfrm>
+          <a:prstGeom prst="rect">
+            <a:avLst/>
+          </a:prstGeom>
+          <a:noFill/>
+        </p:spPr>
+        <p:txBody>
+          <a:bodyPr wrap="none" rtlCol="0">
+            <a:spAutoFit/>
+          </a:bodyPr>
+          <a:lstStyle/>
+          <a:p>
+            <a:r>
+              <a:rPr lang="en-GB" sz="2400" b="1" dirty="0">
+                <a:solidFill>
+                  <a:schemeClr val="bg1"/>
+                </a:solidFill>
+              </a:rPr>
+              <a:t>9/9</a:t>
+            </a:r>
+          </a:p>
+        </p:txBody>
+      </p:sp>
+    </p:spTree>
+    <p:extLst>
+      <p:ext uri="{BB962C8B-B14F-4D97-AF65-F5344CB8AC3E}">
+        <p14:creationId xmlns:p14="http://schemas.microsoft.com/office/powerpoint/2010/main" val="218905446"/>
       </p:ext>
     </p:extLst>
   </p:cSld>

</xml_diff>